<commit_message>
add pdf for slide
</commit_message>
<xml_diff>
--- a/Documents/seminar.pptx
+++ b/Documents/seminar.pptx
@@ -6496,100 +6496,139 @@
             </a:r>
             <a:r>
               <a:rPr lang="en-US" dirty="0"/>
-              <a:t> </a:t>
-            </a:r>
-            <a:r>
-              <a:rPr lang="en-US"/>
-              <a:t>cache storage)</a:t>
+              <a:t> cache storage)</a:t>
+            </a:r>
+          </a:p>
+          <a:p>
+            <a:r>
+              <a:rPr lang="en-US" dirty="0"/>
+              <a:t>-&gt; load </a:t>
+            </a:r>
+            <a:r>
+              <a:rPr lang="en-US" dirty="0" err="1"/>
+              <a:t>nhiều</a:t>
+            </a:r>
+            <a:r>
+              <a:rPr lang="en-US" dirty="0"/>
+              <a:t> -&gt; NHƯNG -&gt; </a:t>
+            </a:r>
+            <a:r>
+              <a:rPr lang="en-US" dirty="0" err="1"/>
+              <a:t>chỉ</a:t>
+            </a:r>
+            <a:r>
+              <a:rPr lang="en-US" dirty="0"/>
+              <a:t> </a:t>
+            </a:r>
+            <a:r>
+              <a:rPr lang="en-US" dirty="0" err="1"/>
+              <a:t>là</a:t>
+            </a:r>
+            <a:r>
+              <a:rPr lang="en-US" dirty="0"/>
+              <a:t> </a:t>
+            </a:r>
+            <a:r>
+              <a:rPr lang="en-US" dirty="0" err="1"/>
+              <a:t>lần</a:t>
+            </a:r>
+            <a:r>
+              <a:rPr lang="en-US" dirty="0"/>
+              <a:t> </a:t>
+            </a:r>
+            <a:r>
+              <a:rPr lang="en-US" dirty="0" err="1"/>
+              <a:t>đầu</a:t>
+            </a:r>
+            <a:r>
+              <a:rPr lang="en-US" dirty="0"/>
+              <a:t> </a:t>
+            </a:r>
+            <a:r>
+              <a:rPr lang="en-US" dirty="0" err="1"/>
+              <a:t>tiên</a:t>
+            </a:r>
+            <a:r>
+              <a:rPr lang="en-US" dirty="0"/>
+              <a:t> -&gt; cache </a:t>
+            </a:r>
+            <a:r>
+              <a:rPr lang="en-US" dirty="0" err="1"/>
+              <a:t>lại</a:t>
+            </a:r>
+            <a:r>
+              <a:rPr lang="en-US" dirty="0"/>
+              <a:t> </a:t>
+            </a:r>
+            <a:r>
+              <a:rPr lang="en-US" dirty="0" err="1"/>
+              <a:t>rồi</a:t>
             </a:r>
             <a:endParaRPr lang="en-US" dirty="0"/>
           </a:p>
           <a:p>
-            <a:r>
-              <a:rPr lang="en-US" dirty="0"/>
-              <a:t>-&gt; load </a:t>
-            </a:r>
-            <a:r>
-              <a:rPr lang="en-US" dirty="0" err="1"/>
-              <a:t>nhiều</a:t>
-            </a:r>
-            <a:r>
-              <a:rPr lang="en-US" dirty="0"/>
-              <a:t> -&gt; NHƯNG -&gt; </a:t>
-            </a:r>
-            <a:r>
-              <a:rPr lang="en-US" dirty="0" err="1"/>
-              <a:t>chỉ</a:t>
-            </a:r>
-            <a:r>
-              <a:rPr lang="en-US" dirty="0"/>
-              <a:t> </a:t>
-            </a:r>
-            <a:r>
-              <a:rPr lang="en-US" dirty="0" err="1"/>
-              <a:t>là</a:t>
-            </a:r>
-            <a:r>
-              <a:rPr lang="en-US" dirty="0"/>
-              <a:t> </a:t>
-            </a:r>
-            <a:r>
-              <a:rPr lang="en-US" dirty="0" err="1"/>
-              <a:t>lần</a:t>
-            </a:r>
-            <a:r>
-              <a:rPr lang="en-US" dirty="0"/>
-              <a:t> </a:t>
-            </a:r>
-            <a:r>
-              <a:rPr lang="en-US" dirty="0" err="1"/>
-              <a:t>đầu</a:t>
-            </a:r>
-            <a:r>
-              <a:rPr lang="en-US" dirty="0"/>
-              <a:t> </a:t>
-            </a:r>
-            <a:r>
-              <a:rPr lang="en-US" dirty="0" err="1"/>
-              <a:t>tiên</a:t>
-            </a:r>
-            <a:r>
-              <a:rPr lang="en-US" dirty="0"/>
-              <a:t> -&gt; cache </a:t>
-            </a:r>
-            <a:r>
-              <a:rPr lang="en-US" dirty="0" err="1"/>
-              <a:t>lại</a:t>
-            </a:r>
-            <a:r>
-              <a:rPr lang="en-US" dirty="0"/>
-              <a:t> </a:t>
-            </a:r>
-            <a:r>
-              <a:rPr lang="en-US" dirty="0" err="1"/>
-              <a:t>rồi</a:t>
-            </a:r>
             <a:endParaRPr lang="en-US" dirty="0"/>
           </a:p>
           <a:p>
+            <a:r>
+              <a:rPr lang="en-US" dirty="0" err="1"/>
+              <a:t>Bật</a:t>
+            </a:r>
+            <a:r>
+              <a:rPr lang="en-US" dirty="0"/>
+              <a:t> solution </a:t>
+            </a:r>
+            <a:r>
+              <a:rPr lang="en-US" dirty="0" err="1"/>
+              <a:t>lên</a:t>
+            </a:r>
+            <a:r>
+              <a:rPr lang="en-US" dirty="0"/>
+              <a:t> -&gt; </a:t>
+            </a:r>
+            <a:r>
+              <a:rPr lang="en-US" dirty="0" err="1"/>
+              <a:t>có</a:t>
+            </a:r>
+            <a:r>
+              <a:rPr lang="en-US" dirty="0"/>
+              <a:t> </a:t>
+            </a:r>
+            <a:r>
+              <a:rPr lang="en-US" dirty="0" err="1"/>
+              <a:t>thể</a:t>
+            </a:r>
+            <a:r>
+              <a:rPr lang="en-US" dirty="0"/>
+              <a:t> dung VS Code or VS</a:t>
+            </a:r>
+          </a:p>
+          <a:p>
             <a:endParaRPr lang="en-US" dirty="0"/>
           </a:p>
           <a:p>
             <a:r>
-              <a:rPr lang="en-US" dirty="0" err="1"/>
-              <a:t>Bật</a:t>
-            </a:r>
-            <a:r>
-              <a:rPr lang="en-US" dirty="0"/>
-              <a:t> solution </a:t>
-            </a:r>
-            <a:r>
-              <a:rPr lang="en-US" dirty="0" err="1"/>
-              <a:t>lên</a:t>
-            </a:r>
-            <a:r>
-              <a:rPr lang="en-US" dirty="0"/>
-              <a:t> -&gt; </a:t>
+              <a:rPr lang="en-US" dirty="0"/>
+              <a:t>-&gt; </a:t>
+            </a:r>
+            <a:r>
+              <a:rPr lang="en-US" dirty="0" err="1"/>
+              <a:t>mở</a:t>
+            </a:r>
+            <a:r>
+              <a:rPr lang="en-US" dirty="0"/>
+              <a:t> file </a:t>
+            </a:r>
+            <a:r>
+              <a:rPr lang="en-US" dirty="0" err="1"/>
+              <a:t>program.cs</a:t>
+            </a:r>
+            <a:endParaRPr lang="en-US" dirty="0"/>
+          </a:p>
+          <a:p>
+            <a:r>
+              <a:rPr lang="en-US" dirty="0"/>
+              <a:t>-&gt; </a:t>
             </a:r>
             <a:r>
               <a:rPr lang="en-US" dirty="0" err="1"/>
@@ -6601,342 +6640,471 @@
             </a:r>
             <a:r>
               <a:rPr lang="en-US" dirty="0" err="1"/>
+              <a:t>rootcomponent</a:t>
+            </a:r>
+            <a:r>
+              <a:rPr lang="en-US" dirty="0"/>
+              <a:t> -&gt;  </a:t>
+            </a:r>
+            <a:r>
+              <a:rPr lang="en-US" dirty="0" err="1"/>
+              <a:t>nó</a:t>
+            </a:r>
+            <a:r>
+              <a:rPr lang="en-US" dirty="0"/>
+              <a:t> </a:t>
+            </a:r>
+            <a:r>
+              <a:rPr lang="en-US" dirty="0" err="1"/>
+              <a:t>sẽ</a:t>
+            </a:r>
+            <a:r>
+              <a:rPr lang="en-US" dirty="0"/>
+              <a:t> </a:t>
+            </a:r>
+            <a:r>
+              <a:rPr lang="en-US" dirty="0" err="1"/>
+              <a:t>hiển</a:t>
+            </a:r>
+            <a:r>
+              <a:rPr lang="en-US" dirty="0"/>
+              <a:t> </a:t>
+            </a:r>
+            <a:r>
+              <a:rPr lang="en-US" dirty="0" err="1"/>
+              <a:t>thị</a:t>
+            </a:r>
+            <a:r>
+              <a:rPr lang="en-US" dirty="0"/>
+              <a:t> </a:t>
+            </a:r>
+            <a:r>
+              <a:rPr lang="en-US" dirty="0" err="1"/>
+              <a:t>cái</a:t>
+            </a:r>
+            <a:r>
+              <a:rPr lang="en-US" dirty="0"/>
+              <a:t> j -&gt; </a:t>
+            </a:r>
+            <a:r>
+              <a:rPr lang="en-US" dirty="0" err="1"/>
+              <a:t>có</a:t>
+            </a:r>
+            <a:r>
+              <a:rPr lang="en-US" dirty="0"/>
+              <a:t> index.html -&gt; id = app -&gt; </a:t>
+            </a:r>
+            <a:r>
+              <a:rPr lang="en-US" dirty="0" err="1"/>
+              <a:t>hiển</a:t>
+            </a:r>
+            <a:r>
+              <a:rPr lang="en-US" dirty="0"/>
+              <a:t> </a:t>
+            </a:r>
+            <a:r>
+              <a:rPr lang="en-US" dirty="0" err="1"/>
+              <a:t>thị</a:t>
+            </a:r>
+            <a:r>
+              <a:rPr lang="en-US" dirty="0"/>
+              <a:t> </a:t>
+            </a:r>
+            <a:r>
+              <a:rPr lang="en-US" dirty="0" err="1"/>
+              <a:t>cái</a:t>
+            </a:r>
+            <a:r>
+              <a:rPr lang="en-US" dirty="0"/>
+              <a:t> </a:t>
+            </a:r>
+            <a:r>
+              <a:rPr lang="en-US" dirty="0" err="1"/>
+              <a:t>này</a:t>
+            </a:r>
+            <a:endParaRPr lang="en-US" dirty="0"/>
+          </a:p>
+          <a:p>
+            <a:r>
+              <a:rPr lang="en-US" dirty="0"/>
+              <a:t>-&gt; </a:t>
+            </a:r>
+            <a:r>
+              <a:rPr lang="en-US" dirty="0" err="1"/>
+              <a:t>có</a:t>
+            </a:r>
+            <a:r>
+              <a:rPr lang="en-US" dirty="0"/>
+              <a:t> file _</a:t>
+            </a:r>
+            <a:r>
+              <a:rPr lang="en-US" dirty="0" err="1"/>
+              <a:t>import.razor</a:t>
+            </a:r>
+            <a:r>
+              <a:rPr lang="en-US" dirty="0"/>
+              <a:t> -&gt; import library</a:t>
+            </a:r>
+          </a:p>
+          <a:p>
+            <a:r>
+              <a:rPr lang="en-US" dirty="0"/>
+              <a:t>-&gt; </a:t>
+            </a:r>
+            <a:r>
+              <a:rPr lang="en-US" dirty="0" err="1"/>
+              <a:t>wwwroot</a:t>
+            </a:r>
+            <a:r>
+              <a:rPr lang="en-US" dirty="0"/>
+              <a:t>: static html, </a:t>
+            </a:r>
+            <a:r>
+              <a:rPr lang="en-US" dirty="0" err="1"/>
+              <a:t>css</a:t>
+            </a:r>
+            <a:r>
+              <a:rPr lang="en-US" dirty="0"/>
+              <a:t> style</a:t>
+            </a:r>
+          </a:p>
+          <a:p>
+            <a:r>
+              <a:rPr lang="en-US" dirty="0"/>
+              <a:t>-&gt; pages: file </a:t>
+            </a:r>
+            <a:r>
+              <a:rPr lang="en-US" dirty="0" err="1"/>
+              <a:t>có</a:t>
+            </a:r>
+            <a:r>
+              <a:rPr lang="en-US" dirty="0"/>
+              <a:t> </a:t>
+            </a:r>
+            <a:r>
+              <a:rPr lang="en-US" dirty="0" err="1"/>
+              <a:t>đuôi</a:t>
+            </a:r>
+            <a:r>
+              <a:rPr lang="en-US" dirty="0"/>
+              <a:t> .razor, style </a:t>
+            </a:r>
+            <a:r>
+              <a:rPr lang="en-US" dirty="0" err="1"/>
+              <a:t>riêng</a:t>
+            </a:r>
+            <a:r>
+              <a:rPr lang="en-US" dirty="0"/>
+              <a:t> </a:t>
+            </a:r>
+            <a:r>
+              <a:rPr lang="en-US" dirty="0" err="1"/>
+              <a:t>từng</a:t>
+            </a:r>
+            <a:r>
+              <a:rPr lang="en-US" dirty="0"/>
+              <a:t> page -&gt; </a:t>
+            </a:r>
+            <a:r>
+              <a:rPr lang="en-US" dirty="0" err="1"/>
+              <a:t>nói</a:t>
+            </a:r>
+            <a:r>
+              <a:rPr lang="en-US" dirty="0"/>
+              <a:t> </a:t>
+            </a:r>
+            <a:r>
+              <a:rPr lang="en-US" dirty="0" err="1"/>
+              <a:t>sơ</a:t>
+            </a:r>
+            <a:r>
+              <a:rPr lang="en-US" dirty="0"/>
+              <a:t> </a:t>
+            </a:r>
+            <a:r>
+              <a:rPr lang="en-US" dirty="0" err="1"/>
+              <a:t>sơ</a:t>
+            </a:r>
+            <a:r>
+              <a:rPr lang="en-US" dirty="0"/>
+              <a:t> </a:t>
+            </a:r>
+            <a:r>
+              <a:rPr lang="en-US" dirty="0" err="1"/>
+              <a:t>về</a:t>
+            </a:r>
+            <a:r>
+              <a:rPr lang="en-US" dirty="0"/>
+              <a:t> component (@page, </a:t>
+            </a:r>
+            <a:r>
+              <a:rPr lang="en-US" dirty="0" err="1"/>
+              <a:t>các</a:t>
+            </a:r>
+            <a:r>
+              <a:rPr lang="en-US" dirty="0"/>
+              <a:t> tag, @code: logic component, </a:t>
+            </a:r>
+            <a:r>
+              <a:rPr lang="en-US" dirty="0" err="1"/>
+              <a:t>có</a:t>
+            </a:r>
+            <a:r>
+              <a:rPr lang="en-US" dirty="0"/>
+              <a:t> </a:t>
+            </a:r>
+            <a:r>
+              <a:rPr lang="en-US" dirty="0" err="1"/>
               <a:t>thể</a:t>
             </a:r>
             <a:r>
               <a:rPr lang="en-US" dirty="0"/>
-              <a:t> dung VS Code or VS</a:t>
-            </a:r>
-          </a:p>
-          <a:p>
+              <a:t> </a:t>
+            </a:r>
+            <a:r>
+              <a:rPr lang="en-US" dirty="0" err="1"/>
+              <a:t>tách</a:t>
+            </a:r>
+            <a:r>
+              <a:rPr lang="en-US" dirty="0"/>
+              <a:t> ra file .CS </a:t>
+            </a:r>
+            <a:r>
+              <a:rPr lang="en-US" dirty="0" err="1"/>
+              <a:t>khác</a:t>
+            </a:r>
+            <a:r>
+              <a:rPr lang="en-US" dirty="0"/>
+              <a:t> =</a:t>
+            </a:r>
+            <a:r>
+              <a:rPr lang="en-US" dirty="0" err="1"/>
+              <a:t>cách</a:t>
+            </a:r>
+            <a:r>
+              <a:rPr lang="en-US" dirty="0"/>
+              <a:t> dung partial class)</a:t>
+            </a:r>
+          </a:p>
+          <a:p>
+            <a:r>
+              <a:rPr lang="en-US" dirty="0"/>
+              <a:t>-&gt; shared: component dung </a:t>
+            </a:r>
+            <a:r>
+              <a:rPr lang="en-US" dirty="0" err="1"/>
+              <a:t>chung</a:t>
+            </a:r>
             <a:endParaRPr lang="en-US" dirty="0"/>
           </a:p>
           <a:p>
-            <a:r>
-              <a:rPr lang="en-US" dirty="0"/>
-              <a:t>-&gt; </a:t>
-            </a:r>
-            <a:r>
-              <a:rPr lang="en-US" dirty="0" err="1"/>
-              <a:t>mở</a:t>
-            </a:r>
-            <a:r>
-              <a:rPr lang="en-US" dirty="0"/>
-              <a:t> file </a:t>
-            </a:r>
-            <a:r>
-              <a:rPr lang="en-US" dirty="0" err="1"/>
-              <a:t>program.cs</a:t>
-            </a:r>
             <a:endParaRPr lang="en-US" dirty="0"/>
           </a:p>
           <a:p>
             <a:r>
               <a:rPr lang="en-US" dirty="0"/>
-              <a:t>-&gt; </a:t>
-            </a:r>
-            <a:r>
-              <a:rPr lang="en-US" dirty="0" err="1"/>
-              <a:t>có</a:t>
-            </a:r>
-            <a:r>
-              <a:rPr lang="en-US" dirty="0"/>
-              <a:t> </a:t>
-            </a:r>
-            <a:r>
-              <a:rPr lang="en-US" dirty="0" err="1"/>
-              <a:t>rootcomponent</a:t>
-            </a:r>
-            <a:r>
-              <a:rPr lang="en-US" dirty="0"/>
-              <a:t> -&gt;  </a:t>
-            </a:r>
-            <a:r>
-              <a:rPr lang="en-US" dirty="0" err="1"/>
-              <a:t>nó</a:t>
-            </a:r>
-            <a:r>
-              <a:rPr lang="en-US" dirty="0"/>
-              <a:t> </a:t>
-            </a:r>
-            <a:r>
-              <a:rPr lang="en-US" dirty="0" err="1"/>
-              <a:t>sẽ</a:t>
-            </a:r>
-            <a:r>
-              <a:rPr lang="en-US" dirty="0"/>
-              <a:t> </a:t>
-            </a:r>
-            <a:r>
-              <a:rPr lang="en-US" dirty="0" err="1"/>
-              <a:t>hiển</a:t>
-            </a:r>
-            <a:r>
-              <a:rPr lang="en-US" dirty="0"/>
-              <a:t> </a:t>
-            </a:r>
-            <a:r>
-              <a:rPr lang="en-US" dirty="0" err="1"/>
-              <a:t>thị</a:t>
-            </a:r>
-            <a:r>
-              <a:rPr lang="en-US" dirty="0"/>
-              <a:t> </a:t>
-            </a:r>
-            <a:r>
-              <a:rPr lang="en-US" dirty="0" err="1"/>
-              <a:t>cái</a:t>
-            </a:r>
-            <a:r>
-              <a:rPr lang="en-US" dirty="0"/>
-              <a:t> j -&gt; </a:t>
-            </a:r>
-            <a:r>
-              <a:rPr lang="en-US" dirty="0" err="1"/>
-              <a:t>có</a:t>
-            </a:r>
-            <a:r>
-              <a:rPr lang="en-US" dirty="0"/>
-              <a:t> index.html -&gt; id = app -&gt; </a:t>
-            </a:r>
-            <a:r>
-              <a:rPr lang="en-US" dirty="0" err="1"/>
-              <a:t>hiển</a:t>
-            </a:r>
-            <a:r>
-              <a:rPr lang="en-US" dirty="0"/>
-              <a:t> </a:t>
-            </a:r>
-            <a:r>
-              <a:rPr lang="en-US" dirty="0" err="1"/>
-              <a:t>thị</a:t>
-            </a:r>
-            <a:r>
-              <a:rPr lang="en-US" dirty="0"/>
-              <a:t> </a:t>
-            </a:r>
-            <a:r>
-              <a:rPr lang="en-US" dirty="0" err="1"/>
-              <a:t>cái</a:t>
-            </a:r>
-            <a:r>
-              <a:rPr lang="en-US" dirty="0"/>
-              <a:t> </a:t>
-            </a:r>
-            <a:r>
-              <a:rPr lang="en-US" dirty="0" err="1"/>
-              <a:t>này</a:t>
-            </a:r>
-            <a:endParaRPr lang="en-US" dirty="0"/>
-          </a:p>
-          <a:p>
-            <a:r>
-              <a:rPr lang="en-US" dirty="0"/>
-              <a:t>-&gt; </a:t>
-            </a:r>
-            <a:r>
-              <a:rPr lang="en-US" dirty="0" err="1"/>
-              <a:t>có</a:t>
-            </a:r>
-            <a:r>
-              <a:rPr lang="en-US" dirty="0"/>
-              <a:t> file _</a:t>
-            </a:r>
-            <a:r>
-              <a:rPr lang="en-US" dirty="0" err="1"/>
-              <a:t>import.razor</a:t>
-            </a:r>
-            <a:r>
-              <a:rPr lang="en-US" dirty="0"/>
-              <a:t> -&gt; import library</a:t>
-            </a:r>
-          </a:p>
-          <a:p>
-            <a:r>
-              <a:rPr lang="en-US" dirty="0"/>
-              <a:t>-&gt; </a:t>
-            </a:r>
-            <a:r>
-              <a:rPr lang="en-US" dirty="0" err="1"/>
-              <a:t>wwwroot</a:t>
-            </a:r>
-            <a:r>
-              <a:rPr lang="en-US" dirty="0"/>
-              <a:t>: static html, </a:t>
-            </a:r>
-            <a:r>
-              <a:rPr lang="en-US" dirty="0" err="1"/>
-              <a:t>css</a:t>
-            </a:r>
-            <a:r>
-              <a:rPr lang="en-US" dirty="0"/>
-              <a:t> style</a:t>
-            </a:r>
-          </a:p>
-          <a:p>
-            <a:r>
-              <a:rPr lang="en-US" dirty="0"/>
-              <a:t>-&gt; pages: file </a:t>
-            </a:r>
-            <a:r>
-              <a:rPr lang="en-US" dirty="0" err="1"/>
-              <a:t>có</a:t>
-            </a:r>
-            <a:r>
-              <a:rPr lang="en-US" dirty="0"/>
-              <a:t> </a:t>
-            </a:r>
-            <a:r>
-              <a:rPr lang="en-US" dirty="0" err="1"/>
-              <a:t>đuôi</a:t>
-            </a:r>
-            <a:r>
-              <a:rPr lang="en-US" dirty="0"/>
-              <a:t> .razor, style </a:t>
-            </a:r>
-            <a:r>
-              <a:rPr lang="en-US" dirty="0" err="1"/>
-              <a:t>riêng</a:t>
-            </a:r>
-            <a:r>
-              <a:rPr lang="en-US" dirty="0"/>
-              <a:t> </a:t>
-            </a:r>
-            <a:r>
-              <a:rPr lang="en-US" dirty="0" err="1"/>
-              <a:t>từng</a:t>
-            </a:r>
-            <a:r>
-              <a:rPr lang="en-US" dirty="0"/>
-              <a:t> page -&gt; </a:t>
-            </a:r>
-            <a:r>
-              <a:rPr lang="en-US" dirty="0" err="1"/>
-              <a:t>nói</a:t>
-            </a:r>
-            <a:r>
-              <a:rPr lang="en-US" dirty="0"/>
-              <a:t> </a:t>
-            </a:r>
-            <a:r>
-              <a:rPr lang="en-US" dirty="0" err="1"/>
-              <a:t>sơ</a:t>
-            </a:r>
-            <a:r>
-              <a:rPr lang="en-US" dirty="0"/>
-              <a:t> </a:t>
-            </a:r>
-            <a:r>
-              <a:rPr lang="en-US" dirty="0" err="1"/>
-              <a:t>sơ</a:t>
-            </a:r>
-            <a:r>
-              <a:rPr lang="en-US" dirty="0"/>
-              <a:t> </a:t>
-            </a:r>
-            <a:r>
-              <a:rPr lang="en-US" dirty="0" err="1"/>
-              <a:t>về</a:t>
-            </a:r>
-            <a:r>
-              <a:rPr lang="en-US" dirty="0"/>
-              <a:t> component (@page, </a:t>
-            </a:r>
-            <a:r>
-              <a:rPr lang="en-US" dirty="0" err="1"/>
-              <a:t>các</a:t>
-            </a:r>
-            <a:r>
-              <a:rPr lang="en-US" dirty="0"/>
-              <a:t> tag, @code: logic component, </a:t>
-            </a:r>
-            <a:r>
-              <a:rPr lang="en-US" dirty="0" err="1"/>
-              <a:t>có</a:t>
-            </a:r>
-            <a:r>
-              <a:rPr lang="en-US" dirty="0"/>
-              <a:t> </a:t>
-            </a:r>
-            <a:r>
-              <a:rPr lang="en-US" dirty="0" err="1"/>
-              <a:t>thể</a:t>
-            </a:r>
-            <a:r>
-              <a:rPr lang="en-US" dirty="0"/>
-              <a:t> </a:t>
-            </a:r>
-            <a:r>
-              <a:rPr lang="en-US" dirty="0" err="1"/>
+              <a:t>Coding:</a:t>
+            </a:r>
+          </a:p>
+          <a:p>
+            <a:r>
+              <a:rPr lang="en-US" dirty="0"/>
+              <a:t>1. </a:t>
+            </a:r>
+            <a:r>
+              <a:rPr lang="en-US" dirty="0" err="1"/>
+              <a:t>Gọi</a:t>
+            </a:r>
+            <a:r>
+              <a:rPr lang="en-US" dirty="0"/>
+              <a:t> component </a:t>
+            </a:r>
+            <a:r>
+              <a:rPr lang="en-US" dirty="0" err="1"/>
+              <a:t>trong</a:t>
+            </a:r>
+            <a:r>
+              <a:rPr lang="en-US" dirty="0"/>
+              <a:t> page</a:t>
+            </a:r>
+          </a:p>
+          <a:p>
+            <a:r>
+              <a:rPr lang="en-US" sz="1800" dirty="0">
+                <a:solidFill>
+                  <a:srgbClr val="000000"/>
+                </a:solidFill>
+                <a:latin typeface="Cascadia Mono" panose="020B0609020000020004" pitchFamily="49" charset="0"/>
+              </a:rPr>
+              <a:t>2.Tạo 1 partial class </a:t>
+            </a:r>
+            <a:r>
+              <a:rPr lang="en-US" sz="1800" dirty="0" err="1">
+                <a:solidFill>
+                  <a:srgbClr val="000000"/>
+                </a:solidFill>
+                <a:latin typeface="Cascadia Mono" panose="020B0609020000020004" pitchFamily="49" charset="0"/>
+              </a:rPr>
+              <a:t>cho</a:t>
+            </a:r>
+            <a:r>
+              <a:rPr lang="en-US" sz="1800" dirty="0">
+                <a:solidFill>
+                  <a:srgbClr val="000000"/>
+                </a:solidFill>
+                <a:latin typeface="Cascadia Mono" panose="020B0609020000020004" pitchFamily="49" charset="0"/>
+              </a:rPr>
+              <a:t> code </a:t>
+            </a:r>
+            <a:r>
+              <a:rPr lang="en-US" sz="1800" dirty="0" err="1">
+                <a:solidFill>
+                  <a:srgbClr val="000000"/>
+                </a:solidFill>
+                <a:latin typeface="Cascadia Mono" panose="020B0609020000020004" pitchFamily="49" charset="0"/>
+              </a:rPr>
+              <a:t>lúc</a:t>
+            </a:r>
+            <a:r>
+              <a:rPr lang="en-US" sz="1800" dirty="0">
+                <a:solidFill>
+                  <a:srgbClr val="000000"/>
+                </a:solidFill>
+                <a:latin typeface="Cascadia Mono" panose="020B0609020000020004" pitchFamily="49" charset="0"/>
+              </a:rPr>
+              <a:t> </a:t>
+            </a:r>
+            <a:r>
+              <a:rPr lang="en-US" sz="1800" dirty="0" err="1">
+                <a:solidFill>
+                  <a:srgbClr val="000000"/>
+                </a:solidFill>
+                <a:latin typeface="Cascadia Mono" panose="020B0609020000020004" pitchFamily="49" charset="0"/>
+              </a:rPr>
+              <a:t>nãy</a:t>
+            </a:r>
+            <a:r>
+              <a:rPr lang="en-US" sz="1800" dirty="0">
+                <a:solidFill>
+                  <a:srgbClr val="000000"/>
+                </a:solidFill>
+                <a:latin typeface="Cascadia Mono" panose="020B0609020000020004" pitchFamily="49" charset="0"/>
+              </a:rPr>
+              <a:t> (partial class: </a:t>
+            </a:r>
+            <a:r>
+              <a:rPr lang="en-US" sz="1800" dirty="0" err="1">
+                <a:solidFill>
+                  <a:srgbClr val="000000"/>
+                </a:solidFill>
+                <a:latin typeface="Cascadia Mono" panose="020B0609020000020004" pitchFamily="49" charset="0"/>
+              </a:rPr>
               <a:t>tách</a:t>
             </a:r>
             <a:r>
-              <a:rPr lang="en-US" dirty="0"/>
-              <a:t> ra file .CS </a:t>
-            </a:r>
-            <a:r>
-              <a:rPr lang="en-US" dirty="0" err="1"/>
-              <a:t>khác</a:t>
-            </a:r>
-            <a:r>
-              <a:rPr lang="en-US" dirty="0"/>
-              <a:t> =</a:t>
-            </a:r>
-            <a:r>
-              <a:rPr lang="en-US" dirty="0" err="1"/>
-              <a:t>cách</a:t>
-            </a:r>
-            <a:r>
-              <a:rPr lang="en-US" dirty="0"/>
-              <a:t> dung partial class)</a:t>
-            </a:r>
-          </a:p>
-          <a:p>
-            <a:r>
-              <a:rPr lang="en-US" dirty="0"/>
-              <a:t>-&gt; shared: component dung </a:t>
-            </a:r>
-            <a:r>
-              <a:rPr lang="en-US" dirty="0" err="1"/>
-              <a:t>chung</a:t>
-            </a:r>
-            <a:endParaRPr lang="en-US" dirty="0"/>
-          </a:p>
-          <a:p>
-            <a:endParaRPr lang="en-US" dirty="0"/>
-          </a:p>
-          <a:p>
-            <a:r>
-              <a:rPr lang="en-US" dirty="0"/>
-              <a:t>Coding:</a:t>
-            </a:r>
-          </a:p>
-          <a:p>
-            <a:r>
-              <a:rPr lang="en-US" dirty="0"/>
-              <a:t>1. </a:t>
-            </a:r>
-            <a:r>
-              <a:rPr lang="en-US" dirty="0" err="1"/>
-              <a:t>Gọi</a:t>
-            </a:r>
-            <a:r>
-              <a:rPr lang="en-US" dirty="0"/>
-              <a:t> component </a:t>
-            </a:r>
-            <a:r>
-              <a:rPr lang="en-US" dirty="0" err="1"/>
-              <a:t>trong</a:t>
-            </a:r>
-            <a:r>
-              <a:rPr lang="en-US" dirty="0"/>
-              <a:t> page</a:t>
-            </a:r>
-          </a:p>
-          <a:p>
-            <a:r>
-              <a:rPr lang="en-US" dirty="0"/>
-              <a:t>2. </a:t>
+              <a:rPr lang="en-US" sz="1800" dirty="0">
+                <a:solidFill>
+                  <a:srgbClr val="000000"/>
+                </a:solidFill>
+                <a:latin typeface="Cascadia Mono" panose="020B0609020000020004" pitchFamily="49" charset="0"/>
+              </a:rPr>
+              <a:t> </a:t>
+            </a:r>
+            <a:r>
+              <a:rPr lang="en-US" sz="1800" dirty="0" err="1">
+                <a:solidFill>
+                  <a:srgbClr val="000000"/>
+                </a:solidFill>
+                <a:latin typeface="Cascadia Mono" panose="020B0609020000020004" pitchFamily="49" charset="0"/>
+              </a:rPr>
+              <a:t>nhỏ</a:t>
+            </a:r>
+            <a:r>
+              <a:rPr lang="en-US" sz="1800" dirty="0">
+                <a:solidFill>
+                  <a:srgbClr val="000000"/>
+                </a:solidFill>
+                <a:latin typeface="Cascadia Mono" panose="020B0609020000020004" pitchFamily="49" charset="0"/>
+              </a:rPr>
+              <a:t> </a:t>
+            </a:r>
+            <a:r>
+              <a:rPr lang="en-US" sz="1800" dirty="0" err="1">
+                <a:solidFill>
+                  <a:srgbClr val="000000"/>
+                </a:solidFill>
+                <a:latin typeface="Cascadia Mono" panose="020B0609020000020004" pitchFamily="49" charset="0"/>
+              </a:rPr>
+              <a:t>để</a:t>
+            </a:r>
+            <a:r>
+              <a:rPr lang="en-US" sz="1800" dirty="0">
+                <a:solidFill>
+                  <a:srgbClr val="000000"/>
+                </a:solidFill>
+                <a:latin typeface="Cascadia Mono" panose="020B0609020000020004" pitchFamily="49" charset="0"/>
+              </a:rPr>
+              <a:t> </a:t>
+            </a:r>
+            <a:r>
+              <a:rPr lang="en-US" sz="1800" dirty="0" err="1">
+                <a:solidFill>
+                  <a:srgbClr val="000000"/>
+                </a:solidFill>
+                <a:latin typeface="Cascadia Mono" panose="020B0609020000020004" pitchFamily="49" charset="0"/>
+              </a:rPr>
+              <a:t>dễ</a:t>
+            </a:r>
+            <a:r>
+              <a:rPr lang="en-US" sz="1800" dirty="0">
+                <a:solidFill>
+                  <a:srgbClr val="000000"/>
+                </a:solidFill>
+                <a:latin typeface="Cascadia Mono" panose="020B0609020000020004" pitchFamily="49" charset="0"/>
+              </a:rPr>
+              <a:t> </a:t>
+            </a:r>
+            <a:r>
+              <a:rPr lang="en-US" sz="1800" dirty="0" err="1">
+                <a:solidFill>
+                  <a:srgbClr val="000000"/>
+                </a:solidFill>
+                <a:latin typeface="Cascadia Mono" panose="020B0609020000020004" pitchFamily="49" charset="0"/>
+              </a:rPr>
+              <a:t>qly</a:t>
+            </a:r>
+            <a:r>
+              <a:rPr lang="en-US" sz="1800" dirty="0">
+                <a:solidFill>
+                  <a:srgbClr val="000000"/>
+                </a:solidFill>
+                <a:latin typeface="Cascadia Mono" panose="020B0609020000020004" pitchFamily="49" charset="0"/>
+              </a:rPr>
+              <a:t> code </a:t>
+            </a:r>
+            <a:r>
+              <a:rPr lang="en-US" sz="1800" dirty="0" err="1">
+                <a:solidFill>
+                  <a:srgbClr val="000000"/>
+                </a:solidFill>
+                <a:latin typeface="Cascadia Mono" panose="020B0609020000020004" pitchFamily="49" charset="0"/>
+              </a:rPr>
+              <a:t>hơn</a:t>
+            </a:r>
+            <a:r>
+              <a:rPr lang="en-US" sz="1800" dirty="0">
+                <a:solidFill>
+                  <a:srgbClr val="000000"/>
+                </a:solidFill>
+                <a:latin typeface="Cascadia Mono" panose="020B0609020000020004" pitchFamily="49" charset="0"/>
+              </a:rPr>
+              <a:t>)</a:t>
+            </a:r>
+          </a:p>
+          <a:p>
+            <a:r>
+              <a:rPr lang="en-US" dirty="0"/>
+              <a:t>3. </a:t>
             </a:r>
             <a:r>
               <a:rPr lang="en-US" dirty="0" err="1"/>
@@ -7061,7 +7229,7 @@
           </a:p>
           <a:p>
             <a:r>
-              <a:rPr lang="en-US" sz="1800" dirty="0">
+              <a:rPr lang="en-US" sz="1800">
                 <a:solidFill>
                   <a:srgbClr val="000000"/>
                 </a:solidFill>
@@ -7071,177 +7239,6 @@
             </a:r>
           </a:p>
           <a:p>
-            <a:r>
-              <a:rPr lang="en-US" sz="1800" dirty="0">
-                <a:solidFill>
-                  <a:srgbClr val="000000"/>
-                </a:solidFill>
-                <a:latin typeface="Cascadia Mono" panose="020B0609020000020004" pitchFamily="49" charset="0"/>
-              </a:rPr>
-              <a:t>3.Tạo 1 partial class </a:t>
-            </a:r>
-            <a:r>
-              <a:rPr lang="en-US" sz="1800" dirty="0" err="1">
-                <a:solidFill>
-                  <a:srgbClr val="000000"/>
-                </a:solidFill>
-                <a:latin typeface="Cascadia Mono" panose="020B0609020000020004" pitchFamily="49" charset="0"/>
-              </a:rPr>
-              <a:t>cho</a:t>
-            </a:r>
-            <a:r>
-              <a:rPr lang="en-US" sz="1800" dirty="0">
-                <a:solidFill>
-                  <a:srgbClr val="000000"/>
-                </a:solidFill>
-                <a:latin typeface="Cascadia Mono" panose="020B0609020000020004" pitchFamily="49" charset="0"/>
-              </a:rPr>
-              <a:t> code </a:t>
-            </a:r>
-            <a:r>
-              <a:rPr lang="en-US" sz="1800" dirty="0" err="1">
-                <a:solidFill>
-                  <a:srgbClr val="000000"/>
-                </a:solidFill>
-                <a:latin typeface="Cascadia Mono" panose="020B0609020000020004" pitchFamily="49" charset="0"/>
-              </a:rPr>
-              <a:t>lúc</a:t>
-            </a:r>
-            <a:r>
-              <a:rPr lang="en-US" sz="1800" dirty="0">
-                <a:solidFill>
-                  <a:srgbClr val="000000"/>
-                </a:solidFill>
-                <a:latin typeface="Cascadia Mono" panose="020B0609020000020004" pitchFamily="49" charset="0"/>
-              </a:rPr>
-              <a:t> </a:t>
-            </a:r>
-            <a:r>
-              <a:rPr lang="en-US" sz="1800" dirty="0" err="1">
-                <a:solidFill>
-                  <a:srgbClr val="000000"/>
-                </a:solidFill>
-                <a:latin typeface="Cascadia Mono" panose="020B0609020000020004" pitchFamily="49" charset="0"/>
-              </a:rPr>
-              <a:t>nãy</a:t>
-            </a:r>
-            <a:r>
-              <a:rPr lang="en-US" sz="1800" dirty="0">
-                <a:solidFill>
-                  <a:srgbClr val="000000"/>
-                </a:solidFill>
-                <a:latin typeface="Cascadia Mono" panose="020B0609020000020004" pitchFamily="49" charset="0"/>
-              </a:rPr>
-              <a:t> (partial class: </a:t>
-            </a:r>
-            <a:r>
-              <a:rPr lang="en-US" sz="1800" dirty="0" err="1">
-                <a:solidFill>
-                  <a:srgbClr val="000000"/>
-                </a:solidFill>
-                <a:latin typeface="Cascadia Mono" panose="020B0609020000020004" pitchFamily="49" charset="0"/>
-              </a:rPr>
-              <a:t>tách</a:t>
-            </a:r>
-            <a:r>
-              <a:rPr lang="en-US" sz="1800" dirty="0">
-                <a:solidFill>
-                  <a:srgbClr val="000000"/>
-                </a:solidFill>
-                <a:latin typeface="Cascadia Mono" panose="020B0609020000020004" pitchFamily="49" charset="0"/>
-              </a:rPr>
-              <a:t> </a:t>
-            </a:r>
-            <a:r>
-              <a:rPr lang="en-US" sz="1800" dirty="0" err="1">
-                <a:solidFill>
-                  <a:srgbClr val="000000"/>
-                </a:solidFill>
-                <a:latin typeface="Cascadia Mono" panose="020B0609020000020004" pitchFamily="49" charset="0"/>
-              </a:rPr>
-              <a:t>nhỏ</a:t>
-            </a:r>
-            <a:r>
-              <a:rPr lang="en-US" sz="1800" dirty="0">
-                <a:solidFill>
-                  <a:srgbClr val="000000"/>
-                </a:solidFill>
-                <a:latin typeface="Cascadia Mono" panose="020B0609020000020004" pitchFamily="49" charset="0"/>
-              </a:rPr>
-              <a:t> </a:t>
-            </a:r>
-            <a:r>
-              <a:rPr lang="en-US" sz="1800" dirty="0" err="1">
-                <a:solidFill>
-                  <a:srgbClr val="000000"/>
-                </a:solidFill>
-                <a:latin typeface="Cascadia Mono" panose="020B0609020000020004" pitchFamily="49" charset="0"/>
-              </a:rPr>
-              <a:t>để</a:t>
-            </a:r>
-            <a:r>
-              <a:rPr lang="en-US" sz="1800" dirty="0">
-                <a:solidFill>
-                  <a:srgbClr val="000000"/>
-                </a:solidFill>
-                <a:latin typeface="Cascadia Mono" panose="020B0609020000020004" pitchFamily="49" charset="0"/>
-              </a:rPr>
-              <a:t> </a:t>
-            </a:r>
-            <a:r>
-              <a:rPr lang="en-US" sz="1800" dirty="0" err="1">
-                <a:solidFill>
-                  <a:srgbClr val="000000"/>
-                </a:solidFill>
-                <a:latin typeface="Cascadia Mono" panose="020B0609020000020004" pitchFamily="49" charset="0"/>
-              </a:rPr>
-              <a:t>dễ</a:t>
-            </a:r>
-            <a:r>
-              <a:rPr lang="en-US" sz="1800" dirty="0">
-                <a:solidFill>
-                  <a:srgbClr val="000000"/>
-                </a:solidFill>
-                <a:latin typeface="Cascadia Mono" panose="020B0609020000020004" pitchFamily="49" charset="0"/>
-              </a:rPr>
-              <a:t> </a:t>
-            </a:r>
-            <a:r>
-              <a:rPr lang="en-US" sz="1800" dirty="0" err="1">
-                <a:solidFill>
-                  <a:srgbClr val="000000"/>
-                </a:solidFill>
-                <a:latin typeface="Cascadia Mono" panose="020B0609020000020004" pitchFamily="49" charset="0"/>
-              </a:rPr>
-              <a:t>qly</a:t>
-            </a:r>
-            <a:r>
-              <a:rPr lang="en-US" sz="1800" dirty="0">
-                <a:solidFill>
-                  <a:srgbClr val="000000"/>
-                </a:solidFill>
-                <a:latin typeface="Cascadia Mono" panose="020B0609020000020004" pitchFamily="49" charset="0"/>
-              </a:rPr>
-              <a:t> code </a:t>
-            </a:r>
-            <a:r>
-              <a:rPr lang="en-US" sz="1800" dirty="0" err="1">
-                <a:solidFill>
-                  <a:srgbClr val="000000"/>
-                </a:solidFill>
-                <a:latin typeface="Cascadia Mono" panose="020B0609020000020004" pitchFamily="49" charset="0"/>
-              </a:rPr>
-              <a:t>hơn</a:t>
-            </a:r>
-            <a:r>
-              <a:rPr lang="en-US" sz="1800" dirty="0">
-                <a:solidFill>
-                  <a:srgbClr val="000000"/>
-                </a:solidFill>
-                <a:latin typeface="Cascadia Mono" panose="020B0609020000020004" pitchFamily="49" charset="0"/>
-              </a:rPr>
-              <a:t>)</a:t>
-            </a:r>
             <a:endParaRPr lang="en-US" dirty="0"/>
           </a:p>
         </p:txBody>

</xml_diff>